<commit_message>
adding date time from another fields of obx for v251
</commit_message>
<xml_diff>
--- a/poster/hl7v2ToOMOP_OHDSI_2019.pptx
+++ b/poster/hl7v2ToOMOP_OHDSI_2019.pptx
@@ -564,6 +564,11 @@
         </p:txBody>
       </p:sp>
     </p:spTree>
+    <p:extLst>
+      <p:ext uri="{BB962C8B-B14F-4D97-AF65-F5344CB8AC3E}">
+        <p14:creationId xmlns:p14="http://schemas.microsoft.com/office/powerpoint/2010/main" val="761919121"/>
+      </p:ext>
+    </p:extLst>
   </p:cSld>
   <p:clrMap bg1="lt1" tx1="dk1" bg2="lt2" tx2="dk2" accent1="accent1" accent2="accent2" accent3="accent3" accent4="accent4" accent5="accent5" accent6="accent6" hlink="hlink" folHlink="folHlink"/>
   <p:notesStyle>
@@ -3132,7 +3137,7 @@
                   <a:schemeClr val="bg1"/>
                 </a:solidFill>
               </a:rPr>
-              <a:t>Electronic Lab Report in </a:t>
+              <a:t>Electronic Lab Reports in </a:t>
             </a:r>
             <a:r>
               <a:rPr lang="en-US" dirty="0">
@@ -3195,7 +3200,7 @@
                   <a:schemeClr val="bg1"/>
                 </a:solidFill>
               </a:rPr>
-              <a:t> to FHIR message. Then, the message is </a:t>
+              <a:t> to FHIR, then </a:t>
             </a:r>
             <a:r>
               <a:rPr lang="en-US" dirty="0">
@@ -3277,6 +3282,47 @@
               </a:rPr>
               <a:t>.</a:t>
             </a:r>
+          </a:p>
+          <a:p>
+            <a:pPr>
+              <a:lnSpc>
+                <a:spcPct val="100000"/>
+              </a:lnSpc>
+            </a:pPr>
+            <a:endParaRPr lang="en-US" b="0" dirty="0">
+              <a:solidFill>
+                <a:schemeClr val="bg1"/>
+              </a:solidFill>
+            </a:endParaRPr>
+          </a:p>
+          <a:p>
+            <a:pPr>
+              <a:lnSpc>
+                <a:spcPct val="100000"/>
+              </a:lnSpc>
+            </a:pPr>
+            <a:r>
+              <a:rPr lang="en-US" dirty="0">
+                <a:solidFill>
+                  <a:schemeClr val="bg1"/>
+                </a:solidFill>
+              </a:rPr>
+              <a:t>Result: HL7v2 </a:t>
+            </a:r>
+            <a:r>
+              <a:rPr lang="en-US" dirty="0">
+                <a:solidFill>
+                  <a:schemeClr val="bg1"/>
+                </a:solidFill>
+                <a:sym typeface="Wingdings"/>
+              </a:rPr>
+              <a:t> FHIR</a:t>
+            </a:r>
+            <a:endParaRPr lang="en-US" dirty="0">
+              <a:solidFill>
+                <a:schemeClr val="bg1"/>
+              </a:solidFill>
+            </a:endParaRPr>
           </a:p>
         </p:txBody>
       </p:sp>
@@ -3897,7 +3943,7 @@
         <p:spPr>
           <a:xfrm>
             <a:off x="457200" y="5768892"/>
-            <a:ext cx="7010400" cy="16008100"/>
+            <a:ext cx="7010400" cy="17229332"/>
           </a:xfrm>
           <a:prstGeom prst="rect">
             <a:avLst/>
@@ -4189,9 +4235,6 @@
             </a:pPr>
             <a:r>
               <a:rPr lang="en-US" sz="3200" b="1" dirty="0">
-                <a:solidFill>
-                  <a:srgbClr val="8C1616"/>
-                </a:solidFill>
                 <a:latin typeface="Lato Black" panose="020F0A02020204030203" pitchFamily="34" charset="0"/>
                 <a:cs typeface="Arial" panose="020B0604020202020204" pitchFamily="34" charset="0"/>
               </a:rPr>
@@ -4765,8 +4808,8 @@
         </p:nvSpPr>
         <p:spPr>
           <a:xfrm>
-            <a:off x="36632097" y="28346400"/>
-            <a:ext cx="6682064" cy="1897827"/>
+            <a:off x="36632097" y="28650604"/>
+            <a:ext cx="6682064" cy="1295996"/>
           </a:xfrm>
           <a:prstGeom prst="rect">
             <a:avLst/>
@@ -4803,20 +4846,7 @@
                 <a:latin typeface="Lato" panose="020F0502020204030203" pitchFamily="34" charset="0"/>
                 <a:cs typeface="Lato" panose="020F0502020204030203" pitchFamily="34" charset="0"/>
               </a:rPr>
-              <a:t>Jon Duke, Marla Gorges, </a:t>
-            </a:r>
-            <a:br>
-              <a:rPr lang="en-US" sz="3911" dirty="0">
-                <a:latin typeface="Lato" panose="020F0502020204030203" pitchFamily="34" charset="0"/>
-                <a:cs typeface="Lato" panose="020F0502020204030203" pitchFamily="34" charset="0"/>
-              </a:rPr>
-            </a:br>
-            <a:r>
-              <a:rPr lang="en-US" sz="3911" dirty="0">
-                <a:latin typeface="Lato" panose="020F0502020204030203" pitchFamily="34" charset="0"/>
-                <a:cs typeface="Lato" panose="020F0502020204030203" pitchFamily="34" charset="0"/>
-              </a:rPr>
-              <a:t>Paula Braun</a:t>
+              <a:t>Jon Duke, Marla Gorges</a:t>
             </a:r>
             <a:endParaRPr lang="en-US" sz="3911" b="1" dirty="0">
               <a:latin typeface="Lato" panose="020F0502020204030203" pitchFamily="34" charset="0"/>
@@ -4839,7 +4869,7 @@
         </p:nvSpPr>
         <p:spPr>
           <a:xfrm>
-            <a:off x="36195000" y="28525214"/>
+            <a:off x="36195000" y="28829418"/>
             <a:ext cx="320382" cy="297952"/>
           </a:xfrm>
           <a:custGeom>
@@ -5058,8 +5088,8 @@
         </p:blipFill>
         <p:spPr bwMode="auto">
           <a:xfrm>
-            <a:off x="4800600" y="28803600"/>
-            <a:ext cx="3075999" cy="3703894"/>
+            <a:off x="5334000" y="27035815"/>
+            <a:ext cx="2923599" cy="3520385"/>
           </a:xfrm>
           <a:prstGeom prst="rect">
             <a:avLst/>
@@ -5171,38 +5201,8 @@
         </p:blipFill>
         <p:spPr>
           <a:xfrm>
-            <a:off x="501160" y="22424571"/>
+            <a:off x="430193" y="22402800"/>
             <a:ext cx="7576039" cy="4093029"/>
-          </a:xfrm>
-          <a:prstGeom prst="rect">
-            <a:avLst/>
-          </a:prstGeom>
-        </p:spPr>
-      </p:pic>
-      <p:pic>
-        <p:nvPicPr>
-          <p:cNvPr id="9" name="Picture 8">
-            <a:extLst>
-              <a:ext uri="{FF2B5EF4-FFF2-40B4-BE49-F238E27FC236}">
-                <a16:creationId xmlns:a16="http://schemas.microsoft.com/office/drawing/2014/main" id="{03591D80-4704-9745-900A-BC10BF64FBA4}"/>
-              </a:ext>
-            </a:extLst>
-          </p:cNvPr>
-          <p:cNvPicPr>
-            <a:picLocks noChangeAspect="1"/>
-          </p:cNvPicPr>
-          <p:nvPr/>
-        </p:nvPicPr>
-        <p:blipFill>
-          <a:blip r:embed="rId8"/>
-          <a:stretch>
-            <a:fillRect/>
-          </a:stretch>
-        </p:blipFill>
-        <p:spPr>
-          <a:xfrm>
-            <a:off x="685800" y="29064858"/>
-            <a:ext cx="4228704" cy="3105828"/>
           </a:xfrm>
           <a:prstGeom prst="rect">
             <a:avLst/>
@@ -5237,12 +5237,12 @@
           <a:graphicData uri="http://schemas.openxmlformats.org/presentationml/2006/ole">
             <mc:AlternateContent xmlns:mc="http://schemas.openxmlformats.org/markup-compatibility/2006">
               <mc:Choice xmlns:v="urn:schemas-microsoft-com:vml" Requires="v">
-                <p:oleObj spid="_x0000_s1036" name="Document" r:id="rId9" imgW="5943600" imgH="2540000" progId="Word.Document.12">
+                <p:oleObj spid="_x0000_s1045" name="Document" r:id="rId8" imgW="5943600" imgH="2540000" progId="Word.Document.12">
                   <p:embed/>
                 </p:oleObj>
               </mc:Choice>
               <mc:Fallback>
-                <p:oleObj name="Document" r:id="rId9" imgW="5943600" imgH="2540000" progId="Word.Document.12">
+                <p:oleObj name="Document" r:id="rId8" imgW="5943600" imgH="2540000" progId="Word.Document.12">
                   <p:embed/>
                   <p:pic>
                     <p:nvPicPr>
@@ -5251,7 +5251,7 @@
                       <p:nvPr/>
                     </p:nvPicPr>
                     <p:blipFill>
-                      <a:blip r:embed="rId10"/>
+                      <a:blip r:embed="rId9"/>
                       <a:stretch>
                         <a:fillRect/>
                       </a:stretch>
@@ -5463,10 +5463,40 @@
       </p:cxnSp>
       <p:pic>
         <p:nvPicPr>
-          <p:cNvPr id="7" name="Picture 6">
+          <p:cNvPr id="15" name="Picture 14">
             <a:extLst>
               <a:ext uri="{FF2B5EF4-FFF2-40B4-BE49-F238E27FC236}">
-                <a16:creationId xmlns:a16="http://schemas.microsoft.com/office/drawing/2014/main" id="{D89D0366-DC2D-B74E-9345-B77C688D2FC4}"/>
+                <a16:creationId xmlns:a16="http://schemas.microsoft.com/office/drawing/2014/main" id="{8E75F535-6109-9D4C-9774-8FF4049380CF}"/>
+              </a:ext>
+            </a:extLst>
+          </p:cNvPr>
+          <p:cNvPicPr>
+            <a:picLocks noChangeAspect="1"/>
+          </p:cNvPicPr>
+          <p:nvPr/>
+        </p:nvPicPr>
+        <p:blipFill>
+          <a:blip r:embed="rId10"/>
+          <a:stretch>
+            <a:fillRect/>
+          </a:stretch>
+        </p:blipFill>
+        <p:spPr>
+          <a:xfrm>
+            <a:off x="35558146" y="22607588"/>
+            <a:ext cx="8138875" cy="4976812"/>
+          </a:xfrm>
+          <a:prstGeom prst="rect">
+            <a:avLst/>
+          </a:prstGeom>
+        </p:spPr>
+      </p:pic>
+      <p:pic>
+        <p:nvPicPr>
+          <p:cNvPr id="10" name="Picture 9">
+            <a:extLst>
+              <a:ext uri="{FF2B5EF4-FFF2-40B4-BE49-F238E27FC236}">
+                <a16:creationId xmlns:a16="http://schemas.microsoft.com/office/drawing/2014/main" id="{472C8B25-3275-A54E-B600-B1ECF36966DF}"/>
               </a:ext>
             </a:extLst>
           </p:cNvPr>
@@ -5483,20 +5513,23 @@
         </p:blipFill>
         <p:spPr>
           <a:xfrm>
-            <a:off x="11658600" y="24449041"/>
-            <a:ext cx="4709422" cy="4709422"/>
+            <a:off x="381000" y="30402020"/>
+            <a:ext cx="7711589" cy="1982980"/>
           </a:xfrm>
           <a:prstGeom prst="rect">
             <a:avLst/>
           </a:prstGeom>
+          <a:solidFill>
+            <a:srgbClr val="262626"/>
+          </a:solidFill>
         </p:spPr>
       </p:pic>
       <p:pic>
         <p:nvPicPr>
-          <p:cNvPr id="15" name="Picture 14">
+          <p:cNvPr id="20" name="Picture 19">
             <a:extLst>
               <a:ext uri="{FF2B5EF4-FFF2-40B4-BE49-F238E27FC236}">
-                <a16:creationId xmlns:a16="http://schemas.microsoft.com/office/drawing/2014/main" id="{8E75F535-6109-9D4C-9774-8FF4049380CF}"/>
+                <a16:creationId xmlns:a16="http://schemas.microsoft.com/office/drawing/2014/main" id="{564BD2CF-0EDA-F54C-9BF3-B1077B8C98EA}"/>
               </a:ext>
             </a:extLst>
           </p:cNvPr>
@@ -5513,8 +5546,8 @@
         </p:blipFill>
         <p:spPr>
           <a:xfrm>
-            <a:off x="35558146" y="22607588"/>
-            <a:ext cx="8138875" cy="4976812"/>
+            <a:off x="11658600" y="24443374"/>
+            <a:ext cx="4817426" cy="4817426"/>
           </a:xfrm>
           <a:prstGeom prst="rect">
             <a:avLst/>

</xml_diff>